<commit_message>
Phylogenetic Tree graphics + edits in code
</commit_message>
<xml_diff>
--- a/Report/Graphics.pptx
+++ b/Report/Graphics.pptx
@@ -262,7 +262,7 @@
           <a:p>
             <a:fld id="{8029A9FD-002B-434E-951E-7AA6145AE0CA}" type="datetimeFigureOut">
               <a:rPr lang="en-GB" smtClean="0"/>
-              <a:t>19/02/2021</a:t>
+              <a:t>06/03/2021</a:t>
             </a:fld>
             <a:endParaRPr lang="en-GB"/>
           </a:p>
@@ -462,7 +462,7 @@
           <a:p>
             <a:fld id="{8029A9FD-002B-434E-951E-7AA6145AE0CA}" type="datetimeFigureOut">
               <a:rPr lang="en-GB" smtClean="0"/>
-              <a:t>19/02/2021</a:t>
+              <a:t>06/03/2021</a:t>
             </a:fld>
             <a:endParaRPr lang="en-GB"/>
           </a:p>
@@ -672,7 +672,7 @@
           <a:p>
             <a:fld id="{8029A9FD-002B-434E-951E-7AA6145AE0CA}" type="datetimeFigureOut">
               <a:rPr lang="en-GB" smtClean="0"/>
-              <a:t>19/02/2021</a:t>
+              <a:t>06/03/2021</a:t>
             </a:fld>
             <a:endParaRPr lang="en-GB"/>
           </a:p>
@@ -872,7 +872,7 @@
           <a:p>
             <a:fld id="{8029A9FD-002B-434E-951E-7AA6145AE0CA}" type="datetimeFigureOut">
               <a:rPr lang="en-GB" smtClean="0"/>
-              <a:t>19/02/2021</a:t>
+              <a:t>06/03/2021</a:t>
             </a:fld>
             <a:endParaRPr lang="en-GB"/>
           </a:p>
@@ -1148,7 +1148,7 @@
           <a:p>
             <a:fld id="{8029A9FD-002B-434E-951E-7AA6145AE0CA}" type="datetimeFigureOut">
               <a:rPr lang="en-GB" smtClean="0"/>
-              <a:t>19/02/2021</a:t>
+              <a:t>06/03/2021</a:t>
             </a:fld>
             <a:endParaRPr lang="en-GB"/>
           </a:p>
@@ -1416,7 +1416,7 @@
           <a:p>
             <a:fld id="{8029A9FD-002B-434E-951E-7AA6145AE0CA}" type="datetimeFigureOut">
               <a:rPr lang="en-GB" smtClean="0"/>
-              <a:t>19/02/2021</a:t>
+              <a:t>06/03/2021</a:t>
             </a:fld>
             <a:endParaRPr lang="en-GB"/>
           </a:p>
@@ -1831,7 +1831,7 @@
           <a:p>
             <a:fld id="{8029A9FD-002B-434E-951E-7AA6145AE0CA}" type="datetimeFigureOut">
               <a:rPr lang="en-GB" smtClean="0"/>
-              <a:t>19/02/2021</a:t>
+              <a:t>06/03/2021</a:t>
             </a:fld>
             <a:endParaRPr lang="en-GB"/>
           </a:p>
@@ -1973,7 +1973,7 @@
           <a:p>
             <a:fld id="{8029A9FD-002B-434E-951E-7AA6145AE0CA}" type="datetimeFigureOut">
               <a:rPr lang="en-GB" smtClean="0"/>
-              <a:t>19/02/2021</a:t>
+              <a:t>06/03/2021</a:t>
             </a:fld>
             <a:endParaRPr lang="en-GB"/>
           </a:p>
@@ -2086,7 +2086,7 @@
           <a:p>
             <a:fld id="{8029A9FD-002B-434E-951E-7AA6145AE0CA}" type="datetimeFigureOut">
               <a:rPr lang="en-GB" smtClean="0"/>
-              <a:t>19/02/2021</a:t>
+              <a:t>06/03/2021</a:t>
             </a:fld>
             <a:endParaRPr lang="en-GB"/>
           </a:p>
@@ -2399,7 +2399,7 @@
           <a:p>
             <a:fld id="{8029A9FD-002B-434E-951E-7AA6145AE0CA}" type="datetimeFigureOut">
               <a:rPr lang="en-GB" smtClean="0"/>
-              <a:t>19/02/2021</a:t>
+              <a:t>06/03/2021</a:t>
             </a:fld>
             <a:endParaRPr lang="en-GB"/>
           </a:p>
@@ -2688,7 +2688,7 @@
           <a:p>
             <a:fld id="{8029A9FD-002B-434E-951E-7AA6145AE0CA}" type="datetimeFigureOut">
               <a:rPr lang="en-GB" smtClean="0"/>
-              <a:t>19/02/2021</a:t>
+              <a:t>06/03/2021</a:t>
             </a:fld>
             <a:endParaRPr lang="en-GB"/>
           </a:p>
@@ -2931,7 +2931,7 @@
           <a:p>
             <a:fld id="{8029A9FD-002B-434E-951E-7AA6145AE0CA}" type="datetimeFigureOut">
               <a:rPr lang="en-GB" smtClean="0"/>
-              <a:t>19/02/2021</a:t>
+              <a:t>06/03/2021</a:t>
             </a:fld>
             <a:endParaRPr lang="en-GB"/>
           </a:p>
@@ -3643,6 +3643,20 @@
           <a:prstGeom prst="roundRect">
             <a:avLst/>
           </a:prstGeom>
+          <a:solidFill>
+            <a:schemeClr val="accent6">
+              <a:lumMod val="60000"/>
+              <a:lumOff val="40000"/>
+            </a:schemeClr>
+          </a:solidFill>
+          <a:ln>
+            <a:solidFill>
+              <a:schemeClr val="tx1">
+                <a:lumMod val="65000"/>
+                <a:lumOff val="35000"/>
+              </a:schemeClr>
+            </a:solidFill>
+          </a:ln>
         </p:spPr>
         <p:style>
           <a:lnRef idx="2">
@@ -3666,7 +3680,14 @@
           <a:p>
             <a:pPr algn="ctr"/>
             <a:r>
-              <a:rPr lang="en-GB" dirty="0"/>
+              <a:rPr lang="en-GB" dirty="0">
+                <a:solidFill>
+                  <a:schemeClr val="tx1">
+                    <a:lumMod val="95000"/>
+                    <a:lumOff val="5000"/>
+                  </a:schemeClr>
+                </a:solidFill>
+              </a:rPr>
               <a:t>1483 Search Results</a:t>
             </a:r>
           </a:p>
@@ -3692,6 +3713,20 @@
           <a:prstGeom prst="roundRect">
             <a:avLst/>
           </a:prstGeom>
+          <a:solidFill>
+            <a:schemeClr val="accent6">
+              <a:lumMod val="60000"/>
+              <a:lumOff val="40000"/>
+            </a:schemeClr>
+          </a:solidFill>
+          <a:ln>
+            <a:solidFill>
+              <a:schemeClr val="tx1">
+                <a:lumMod val="65000"/>
+                <a:lumOff val="35000"/>
+              </a:schemeClr>
+            </a:solidFill>
+          </a:ln>
         </p:spPr>
         <p:style>
           <a:lnRef idx="2">
@@ -3715,7 +3750,14 @@
           <a:p>
             <a:pPr algn="ctr"/>
             <a:r>
-              <a:rPr lang="en-GB" dirty="0"/>
+              <a:rPr lang="en-GB" dirty="0">
+                <a:solidFill>
+                  <a:schemeClr val="tx1">
+                    <a:lumMod val="95000"/>
+                    <a:lumOff val="5000"/>
+                  </a:schemeClr>
+                </a:solidFill>
+              </a:rPr>
               <a:t>347</a:t>
             </a:r>
           </a:p>
@@ -3741,6 +3783,20 @@
           <a:prstGeom prst="roundRect">
             <a:avLst/>
           </a:prstGeom>
+          <a:solidFill>
+            <a:schemeClr val="accent6">
+              <a:lumMod val="60000"/>
+              <a:lumOff val="40000"/>
+            </a:schemeClr>
+          </a:solidFill>
+          <a:ln>
+            <a:solidFill>
+              <a:schemeClr val="tx1">
+                <a:lumMod val="65000"/>
+                <a:lumOff val="35000"/>
+              </a:schemeClr>
+            </a:solidFill>
+          </a:ln>
         </p:spPr>
         <p:style>
           <a:lnRef idx="2">
@@ -3764,7 +3820,14 @@
           <a:p>
             <a:pPr algn="ctr"/>
             <a:r>
-              <a:rPr lang="en-GB" dirty="0"/>
+              <a:rPr lang="en-GB" dirty="0">
+                <a:solidFill>
+                  <a:schemeClr val="tx1">
+                    <a:lumMod val="95000"/>
+                    <a:lumOff val="5000"/>
+                  </a:schemeClr>
+                </a:solidFill>
+              </a:rPr>
               <a:t>263</a:t>
             </a:r>
           </a:p>
@@ -3790,6 +3853,20 @@
           <a:prstGeom prst="roundRect">
             <a:avLst/>
           </a:prstGeom>
+          <a:solidFill>
+            <a:schemeClr val="accent6">
+              <a:lumMod val="60000"/>
+              <a:lumOff val="40000"/>
+            </a:schemeClr>
+          </a:solidFill>
+          <a:ln>
+            <a:solidFill>
+              <a:schemeClr val="tx1">
+                <a:lumMod val="65000"/>
+                <a:lumOff val="35000"/>
+              </a:schemeClr>
+            </a:solidFill>
+          </a:ln>
         </p:spPr>
         <p:style>
           <a:lnRef idx="2">
@@ -3813,7 +3890,14 @@
           <a:p>
             <a:pPr algn="ctr"/>
             <a:r>
-              <a:rPr lang="en-GB" dirty="0"/>
+              <a:rPr lang="en-GB" dirty="0">
+                <a:solidFill>
+                  <a:schemeClr val="tx1">
+                    <a:lumMod val="95000"/>
+                    <a:lumOff val="5000"/>
+                  </a:schemeClr>
+                </a:solidFill>
+              </a:rPr>
               <a:t>201</a:t>
             </a:r>
           </a:p>
@@ -3839,6 +3923,20 @@
           <a:prstGeom prst="roundRect">
             <a:avLst/>
           </a:prstGeom>
+          <a:solidFill>
+            <a:schemeClr val="accent6">
+              <a:lumMod val="60000"/>
+              <a:lumOff val="40000"/>
+            </a:schemeClr>
+          </a:solidFill>
+          <a:ln>
+            <a:solidFill>
+              <a:schemeClr val="tx1">
+                <a:lumMod val="65000"/>
+                <a:lumOff val="35000"/>
+              </a:schemeClr>
+            </a:solidFill>
+          </a:ln>
         </p:spPr>
         <p:style>
           <a:lnRef idx="2">
@@ -3862,8 +3960,15 @@
           <a:p>
             <a:pPr algn="ctr"/>
             <a:r>
-              <a:rPr lang="en-GB" dirty="0"/>
-              <a:t>177</a:t>
+              <a:rPr lang="en-GB" dirty="0">
+                <a:solidFill>
+                  <a:schemeClr val="tx1">
+                    <a:lumMod val="95000"/>
+                    <a:lumOff val="5000"/>
+                  </a:schemeClr>
+                </a:solidFill>
+              </a:rPr>
+              <a:t>177 Final Papers</a:t>
             </a:r>
           </a:p>
         </p:txBody>
@@ -3882,12 +3987,24 @@
         </p:nvSpPr>
         <p:spPr>
           <a:xfrm>
-            <a:off x="2235655" y="1704876"/>
+            <a:off x="1539368" y="1704876"/>
             <a:ext cx="276837" cy="337972"/>
           </a:xfrm>
           <a:prstGeom prst="downArrow">
             <a:avLst/>
           </a:prstGeom>
+          <a:solidFill>
+            <a:schemeClr val="bg2">
+              <a:lumMod val="90000"/>
+            </a:schemeClr>
+          </a:solidFill>
+          <a:ln>
+            <a:solidFill>
+              <a:schemeClr val="bg2">
+                <a:lumMod val="50000"/>
+              </a:schemeClr>
+            </a:solidFill>
+          </a:ln>
         </p:spPr>
         <p:style>
           <a:lnRef idx="2">
@@ -3928,12 +4045,24 @@
         </p:nvSpPr>
         <p:spPr>
           <a:xfrm>
-            <a:off x="2235655" y="2607677"/>
+            <a:off x="1539368" y="2607677"/>
             <a:ext cx="276837" cy="337972"/>
           </a:xfrm>
           <a:prstGeom prst="downArrow">
             <a:avLst/>
           </a:prstGeom>
+          <a:solidFill>
+            <a:schemeClr val="bg2">
+              <a:lumMod val="90000"/>
+            </a:schemeClr>
+          </a:solidFill>
+          <a:ln>
+            <a:solidFill>
+              <a:schemeClr val="bg2">
+                <a:lumMod val="50000"/>
+              </a:schemeClr>
+            </a:solidFill>
+          </a:ln>
         </p:spPr>
         <p:style>
           <a:lnRef idx="2">
@@ -3974,12 +4103,24 @@
         </p:nvSpPr>
         <p:spPr>
           <a:xfrm>
-            <a:off x="2234245" y="4413279"/>
+            <a:off x="1537958" y="4413279"/>
             <a:ext cx="276837" cy="337972"/>
           </a:xfrm>
           <a:prstGeom prst="downArrow">
             <a:avLst/>
           </a:prstGeom>
+          <a:solidFill>
+            <a:schemeClr val="bg2">
+              <a:lumMod val="90000"/>
+            </a:schemeClr>
+          </a:solidFill>
+          <a:ln>
+            <a:solidFill>
+              <a:schemeClr val="bg2">
+                <a:lumMod val="50000"/>
+              </a:schemeClr>
+            </a:solidFill>
+          </a:ln>
         </p:spPr>
         <p:style>
           <a:lnRef idx="2">
@@ -4020,12 +4161,24 @@
         </p:nvSpPr>
         <p:spPr>
           <a:xfrm>
-            <a:off x="2234245" y="3510478"/>
+            <a:off x="1537958" y="3510478"/>
             <a:ext cx="276837" cy="337972"/>
           </a:xfrm>
           <a:prstGeom prst="downArrow">
             <a:avLst/>
           </a:prstGeom>
+          <a:solidFill>
+            <a:schemeClr val="bg2">
+              <a:lumMod val="90000"/>
+            </a:schemeClr>
+          </a:solidFill>
+          <a:ln>
+            <a:solidFill>
+              <a:schemeClr val="bg2">
+                <a:lumMod val="50000"/>
+              </a:schemeClr>
+            </a:solidFill>
+          </a:ln>
         </p:spPr>
         <p:style>
           <a:lnRef idx="2">
@@ -4066,7 +4219,7 @@
         </p:nvSpPr>
         <p:spPr>
           <a:xfrm>
-            <a:off x="2511082" y="1704294"/>
+            <a:off x="1814795" y="1704294"/>
             <a:ext cx="3473042" cy="338554"/>
           </a:xfrm>
           <a:prstGeom prst="rect">
@@ -4101,7 +4254,7 @@
         </p:nvSpPr>
         <p:spPr>
           <a:xfrm>
-            <a:off x="2511082" y="2609306"/>
+            <a:off x="1814795" y="2609306"/>
             <a:ext cx="3473042" cy="338554"/>
           </a:xfrm>
           <a:prstGeom prst="rect">
@@ -4136,7 +4289,7 @@
         </p:nvSpPr>
         <p:spPr>
           <a:xfrm>
-            <a:off x="2511082" y="3515749"/>
+            <a:off x="1814795" y="3515749"/>
             <a:ext cx="3473042" cy="338554"/>
           </a:xfrm>
           <a:prstGeom prst="rect">
@@ -4171,7 +4324,7 @@
         </p:nvSpPr>
         <p:spPr>
           <a:xfrm>
-            <a:off x="2511082" y="4414908"/>
+            <a:off x="1814795" y="4414908"/>
             <a:ext cx="3473042" cy="338554"/>
           </a:xfrm>
           <a:prstGeom prst="rect">

</xml_diff>